<commit_message>
- Adding new presentation - Updating ASP.NET CORE lecture
</commit_message>
<xml_diff>
--- a/docs/ASP.NET CORE - iTechArt 2018.pptx
+++ b/docs/ASP.NET CORE - iTechArt 2018.pptx
@@ -8,10 +8,10 @@
     <p:sldMasterId id="2147483702" r:id="rId4"/>
   </p:sldMasterIdLst>
   <p:notesMasterIdLst>
-    <p:notesMasterId r:id="rId31"/>
+    <p:notesMasterId r:id="rId34"/>
   </p:notesMasterIdLst>
   <p:handoutMasterIdLst>
-    <p:handoutMasterId r:id="rId32"/>
+    <p:handoutMasterId r:id="rId35"/>
   </p:handoutMasterIdLst>
   <p:sldIdLst>
     <p:sldId id="334" r:id="rId5"/>
@@ -37,9 +37,12 @@
     <p:sldId id="541" r:id="rId25"/>
     <p:sldId id="543" r:id="rId26"/>
     <p:sldId id="544" r:id="rId27"/>
-    <p:sldId id="528" r:id="rId28"/>
-    <p:sldId id="520" r:id="rId29"/>
-    <p:sldId id="521" r:id="rId30"/>
+    <p:sldId id="546" r:id="rId28"/>
+    <p:sldId id="547" r:id="rId29"/>
+    <p:sldId id="528" r:id="rId30"/>
+    <p:sldId id="545" r:id="rId31"/>
+    <p:sldId id="520" r:id="rId32"/>
+    <p:sldId id="521" r:id="rId33"/>
   </p:sldIdLst>
   <p:sldSz cx="9144000" cy="6858000" type="screen4x3"/>
   <p:notesSz cx="6858000" cy="9144000"/>
@@ -22876,6 +22879,16 @@
             </a:pPr>
             <a:r>
               <a:rPr lang="en-US" sz="2800" dirty="0" smtClean="0"/>
+              <a:t>Tag Helpers</a:t>
+            </a:r>
+          </a:p>
+          <a:p>
+            <a:pPr marL="457200" indent="-457200">
+              <a:buFont typeface="Wingdings" panose="05000000000000000000" pitchFamily="2" charset="2"/>
+              <a:buChar char="q"/>
+            </a:pPr>
+            <a:r>
+              <a:rPr lang="en-US" sz="2800" dirty="0" smtClean="0"/>
               <a:t>Others</a:t>
             </a:r>
             <a:endParaRPr lang="en-US" dirty="0"/>
@@ -29999,8 +30012,8 @@
           <a:lstStyle/>
           <a:p>
             <a:r>
-              <a:rPr lang="en-US" dirty="0" err="1" smtClean="0"/>
-              <a:t>LOgging</a:t>
+              <a:rPr lang="en-US" dirty="0" smtClean="0"/>
+              <a:t>Logging</a:t>
             </a:r>
             <a:endParaRPr lang="en-US" dirty="0"/>
           </a:p>
@@ -30653,62 +30666,7 @@
       </p:grpSpPr>
       <p:sp>
         <p:nvSpPr>
-          <p:cNvPr id="2" name="Text Placeholder 1"/>
-          <p:cNvSpPr>
-            <a:spLocks noGrp="1"/>
-          </p:cNvSpPr>
-          <p:nvPr>
-            <p:ph type="body" sz="quarter" idx="13"/>
-          </p:nvPr>
-        </p:nvSpPr>
-        <p:spPr>
-          <a:xfrm>
-            <a:off x="2699793" y="3573016"/>
-            <a:ext cx="3744416" cy="945788"/>
-          </a:xfrm>
-        </p:spPr>
-        <p:txBody>
-          <a:bodyPr/>
-          <a:lstStyle/>
-          <a:p>
-            <a:r>
-              <a:rPr lang="en-US" dirty="0"/>
-              <a:t>Linus Torvalds</a:t>
-            </a:r>
-          </a:p>
-        </p:txBody>
-      </p:sp>
-      <p:sp>
-        <p:nvSpPr>
-          <p:cNvPr id="3" name="Text Placeholder 2"/>
-          <p:cNvSpPr>
-            <a:spLocks noGrp="1"/>
-          </p:cNvSpPr>
-          <p:nvPr>
-            <p:ph type="body" sz="quarter" idx="11"/>
-          </p:nvPr>
-        </p:nvSpPr>
-        <p:spPr>
-          <a:xfrm>
-            <a:off x="827585" y="2708921"/>
-            <a:ext cx="7488832" cy="1874092"/>
-          </a:xfrm>
-        </p:spPr>
-        <p:txBody>
-          <a:bodyPr/>
-          <a:lstStyle/>
-          <a:p>
-            <a:pPr algn="ctr"/>
-            <a:r>
-              <a:rPr lang="en-US" sz="3600" dirty="0"/>
-              <a:t>Talk is cheap. Show me the code.</a:t>
-            </a:r>
-          </a:p>
-        </p:txBody>
-      </p:sp>
-      <p:sp>
-        <p:nvSpPr>
-          <p:cNvPr id="4" name="Title 3"/>
+          <p:cNvPr id="2" name="Title 1"/>
           <p:cNvSpPr>
             <a:spLocks noGrp="1"/>
           </p:cNvSpPr>
@@ -30722,8 +30680,8 @@
           <a:lstStyle/>
           <a:p>
             <a:r>
-              <a:rPr lang="en-GB" dirty="0" smtClean="0"/>
-              <a:t>Quote of the day</a:t>
+              <a:rPr lang="en-US" dirty="0" smtClean="0"/>
+              <a:t>Logging</a:t>
             </a:r>
             <a:endParaRPr lang="en-US" dirty="0"/>
           </a:p>
@@ -30731,7 +30689,7 @@
       </p:sp>
       <p:sp>
         <p:nvSpPr>
-          <p:cNvPr id="5" name="Footer Placeholder 4"/>
+          <p:cNvPr id="3" name="Footer Placeholder 2"/>
           <p:cNvSpPr>
             <a:spLocks noGrp="1"/>
           </p:cNvSpPr>
@@ -30752,10 +30710,595 @@
           </a:p>
         </p:txBody>
       </p:sp>
+      <p:sp>
+        <p:nvSpPr>
+          <p:cNvPr id="6" name="Rectangle 5"/>
+          <p:cNvSpPr/>
+          <p:nvPr/>
+        </p:nvSpPr>
+        <p:spPr>
+          <a:xfrm>
+            <a:off x="323852" y="1648545"/>
+            <a:ext cx="8507725" cy="3416320"/>
+          </a:xfrm>
+          <a:prstGeom prst="rect">
+            <a:avLst/>
+          </a:prstGeom>
+          <a:solidFill>
+            <a:sysClr val="window" lastClr="FFFFFF"/>
+          </a:solidFill>
+          <a:ln w="19050" cap="flat" cmpd="sng" algn="ctr">
+            <a:solidFill>
+              <a:srgbClr val="0070C0"/>
+            </a:solidFill>
+            <a:prstDash val="solid"/>
+          </a:ln>
+          <a:effectLst/>
+        </p:spPr>
+        <p:txBody>
+          <a:bodyPr wrap="square">
+            <a:spAutoFit/>
+          </a:bodyPr>
+          <a:lstStyle>
+            <a:defPPr>
+              <a:defRPr lang="en-US"/>
+            </a:defPPr>
+            <a:lvl1pPr marL="0" algn="l" defTabSz="914400" rtl="0" eaLnBrk="1" latinLnBrk="0" hangingPunct="1">
+              <a:defRPr sz="1800" kern="1200">
+                <a:solidFill>
+                  <a:schemeClr val="dk1"/>
+                </a:solidFill>
+                <a:latin typeface="+mn-lt"/>
+                <a:ea typeface="+mn-ea"/>
+                <a:cs typeface="+mn-cs"/>
+              </a:defRPr>
+            </a:lvl1pPr>
+            <a:lvl2pPr marL="457200" algn="l" defTabSz="914400" rtl="0" eaLnBrk="1" latinLnBrk="0" hangingPunct="1">
+              <a:defRPr sz="1800" kern="1200">
+                <a:solidFill>
+                  <a:schemeClr val="dk1"/>
+                </a:solidFill>
+                <a:latin typeface="+mn-lt"/>
+                <a:ea typeface="+mn-ea"/>
+                <a:cs typeface="+mn-cs"/>
+              </a:defRPr>
+            </a:lvl2pPr>
+            <a:lvl3pPr marL="914400" algn="l" defTabSz="914400" rtl="0" eaLnBrk="1" latinLnBrk="0" hangingPunct="1">
+              <a:defRPr sz="1800" kern="1200">
+                <a:solidFill>
+                  <a:schemeClr val="dk1"/>
+                </a:solidFill>
+                <a:latin typeface="+mn-lt"/>
+                <a:ea typeface="+mn-ea"/>
+                <a:cs typeface="+mn-cs"/>
+              </a:defRPr>
+            </a:lvl3pPr>
+            <a:lvl4pPr marL="1371600" algn="l" defTabSz="914400" rtl="0" eaLnBrk="1" latinLnBrk="0" hangingPunct="1">
+              <a:defRPr sz="1800" kern="1200">
+                <a:solidFill>
+                  <a:schemeClr val="dk1"/>
+                </a:solidFill>
+                <a:latin typeface="+mn-lt"/>
+                <a:ea typeface="+mn-ea"/>
+                <a:cs typeface="+mn-cs"/>
+              </a:defRPr>
+            </a:lvl4pPr>
+            <a:lvl5pPr marL="1828800" algn="l" defTabSz="914400" rtl="0" eaLnBrk="1" latinLnBrk="0" hangingPunct="1">
+              <a:defRPr sz="1800" kern="1200">
+                <a:solidFill>
+                  <a:schemeClr val="dk1"/>
+                </a:solidFill>
+                <a:latin typeface="+mn-lt"/>
+                <a:ea typeface="+mn-ea"/>
+                <a:cs typeface="+mn-cs"/>
+              </a:defRPr>
+            </a:lvl5pPr>
+            <a:lvl6pPr marL="2286000" algn="l" defTabSz="914400" rtl="0" eaLnBrk="1" latinLnBrk="0" hangingPunct="1">
+              <a:defRPr sz="1800" kern="1200">
+                <a:solidFill>
+                  <a:schemeClr val="dk1"/>
+                </a:solidFill>
+                <a:latin typeface="+mn-lt"/>
+                <a:ea typeface="+mn-ea"/>
+                <a:cs typeface="+mn-cs"/>
+              </a:defRPr>
+            </a:lvl6pPr>
+            <a:lvl7pPr marL="2743200" algn="l" defTabSz="914400" rtl="0" eaLnBrk="1" latinLnBrk="0" hangingPunct="1">
+              <a:defRPr sz="1800" kern="1200">
+                <a:solidFill>
+                  <a:schemeClr val="dk1"/>
+                </a:solidFill>
+                <a:latin typeface="+mn-lt"/>
+                <a:ea typeface="+mn-ea"/>
+                <a:cs typeface="+mn-cs"/>
+              </a:defRPr>
+            </a:lvl7pPr>
+            <a:lvl8pPr marL="3200400" algn="l" defTabSz="914400" rtl="0" eaLnBrk="1" latinLnBrk="0" hangingPunct="1">
+              <a:defRPr sz="1800" kern="1200">
+                <a:solidFill>
+                  <a:schemeClr val="dk1"/>
+                </a:solidFill>
+                <a:latin typeface="+mn-lt"/>
+                <a:ea typeface="+mn-ea"/>
+                <a:cs typeface="+mn-cs"/>
+              </a:defRPr>
+            </a:lvl8pPr>
+            <a:lvl9pPr marL="3657600" algn="l" defTabSz="914400" rtl="0" eaLnBrk="1" latinLnBrk="0" hangingPunct="1">
+              <a:defRPr sz="1800" kern="1200">
+                <a:solidFill>
+                  <a:schemeClr val="dk1"/>
+                </a:solidFill>
+                <a:latin typeface="+mn-lt"/>
+                <a:ea typeface="+mn-ea"/>
+                <a:cs typeface="+mn-cs"/>
+              </a:defRPr>
+            </a:lvl9pPr>
+          </a:lstStyle>
+          <a:p>
+            <a:r>
+              <a:rPr lang="en-US" dirty="0">
+                <a:solidFill>
+                  <a:srgbClr val="0000FF"/>
+                </a:solidFill>
+                <a:latin typeface="Consolas" panose="020B0609020204030204" pitchFamily="49" charset="0"/>
+                <a:ea typeface="Consolas"/>
+                <a:cs typeface="Consolas" panose="020B0609020204030204" pitchFamily="49" charset="0"/>
+              </a:rPr>
+              <a:t>public class </a:t>
+            </a:r>
+            <a:r>
+              <a:rPr lang="en-US" dirty="0" err="1">
+                <a:solidFill>
+                  <a:srgbClr val="008B8B"/>
+                </a:solidFill>
+                <a:latin typeface="Consolas" panose="020B0609020204030204" pitchFamily="49" charset="0"/>
+                <a:ea typeface="Consolas"/>
+                <a:cs typeface="Consolas" panose="020B0609020204030204" pitchFamily="49" charset="0"/>
+              </a:rPr>
+              <a:t>HomeController</a:t>
+            </a:r>
+            <a:r>
+              <a:rPr lang="en-US" dirty="0">
+                <a:latin typeface="Consolas" panose="020B0609020204030204" pitchFamily="49" charset="0"/>
+                <a:cs typeface="Consolas" panose="020B0609020204030204" pitchFamily="49" charset="0"/>
+              </a:rPr>
+              <a:t> : </a:t>
+            </a:r>
+            <a:r>
+              <a:rPr lang="en-US" dirty="0">
+                <a:solidFill>
+                  <a:srgbClr val="008B8B"/>
+                </a:solidFill>
+                <a:latin typeface="Consolas" panose="020B0609020204030204" pitchFamily="49" charset="0"/>
+                <a:ea typeface="Consolas"/>
+                <a:cs typeface="Consolas" panose="020B0609020204030204" pitchFamily="49" charset="0"/>
+              </a:rPr>
+              <a:t>Controller </a:t>
+            </a:r>
+          </a:p>
+          <a:p>
+            <a:r>
+              <a:rPr lang="en-US" dirty="0">
+                <a:latin typeface="Consolas" panose="020B0609020204030204" pitchFamily="49" charset="0"/>
+                <a:cs typeface="Consolas" panose="020B0609020204030204" pitchFamily="49" charset="0"/>
+              </a:rPr>
+              <a:t>{ </a:t>
+            </a:r>
+          </a:p>
+          <a:p>
+            <a:r>
+              <a:rPr lang="en-US" dirty="0">
+                <a:latin typeface="Consolas" panose="020B0609020204030204" pitchFamily="49" charset="0"/>
+                <a:cs typeface="Consolas" panose="020B0609020204030204" pitchFamily="49" charset="0"/>
+              </a:rPr>
+              <a:t>	</a:t>
+            </a:r>
+            <a:r>
+              <a:rPr lang="en-US" dirty="0">
+                <a:solidFill>
+                  <a:srgbClr val="0000FF"/>
+                </a:solidFill>
+                <a:latin typeface="Consolas" panose="020B0609020204030204" pitchFamily="49" charset="0"/>
+                <a:ea typeface="Consolas"/>
+                <a:cs typeface="Consolas" panose="020B0609020204030204" pitchFamily="49" charset="0"/>
+              </a:rPr>
+              <a:t>private </a:t>
+            </a:r>
+            <a:r>
+              <a:rPr lang="en-US" dirty="0" err="1">
+                <a:solidFill>
+                  <a:srgbClr val="0000FF"/>
+                </a:solidFill>
+                <a:latin typeface="Consolas" panose="020B0609020204030204" pitchFamily="49" charset="0"/>
+                <a:ea typeface="Consolas"/>
+                <a:cs typeface="Consolas" panose="020B0609020204030204" pitchFamily="49" charset="0"/>
+              </a:rPr>
+              <a:t>readonly</a:t>
+            </a:r>
+            <a:r>
+              <a:rPr lang="en-US" dirty="0">
+                <a:solidFill>
+                  <a:srgbClr val="0000FF"/>
+                </a:solidFill>
+                <a:latin typeface="Consolas" panose="020B0609020204030204" pitchFamily="49" charset="0"/>
+                <a:ea typeface="Consolas"/>
+                <a:cs typeface="Consolas" panose="020B0609020204030204" pitchFamily="49" charset="0"/>
+              </a:rPr>
+              <a:t> </a:t>
+            </a:r>
+            <a:r>
+              <a:rPr lang="en-US" dirty="0" err="1" smtClean="0">
+                <a:solidFill>
+                  <a:srgbClr val="008B8B"/>
+                </a:solidFill>
+                <a:latin typeface="Consolas" panose="020B0609020204030204" pitchFamily="49" charset="0"/>
+                <a:ea typeface="Consolas"/>
+                <a:cs typeface="Consolas" panose="020B0609020204030204" pitchFamily="49" charset="0"/>
+              </a:rPr>
+              <a:t>ILogger</a:t>
+            </a:r>
+            <a:r>
+              <a:rPr lang="en-US" dirty="0" smtClean="0">
+                <a:latin typeface="Consolas" panose="020B0609020204030204" pitchFamily="49" charset="0"/>
+                <a:cs typeface="Consolas" panose="020B0609020204030204" pitchFamily="49" charset="0"/>
+              </a:rPr>
+              <a:t> logger; </a:t>
+            </a:r>
+            <a:endParaRPr lang="en-US" dirty="0">
+              <a:latin typeface="Consolas" panose="020B0609020204030204" pitchFamily="49" charset="0"/>
+              <a:cs typeface="Consolas" panose="020B0609020204030204" pitchFamily="49" charset="0"/>
+            </a:endParaRPr>
+          </a:p>
+          <a:p>
+            <a:endParaRPr lang="en-US" dirty="0">
+              <a:latin typeface="Consolas" panose="020B0609020204030204" pitchFamily="49" charset="0"/>
+              <a:cs typeface="Consolas" panose="020B0609020204030204" pitchFamily="49" charset="0"/>
+            </a:endParaRPr>
+          </a:p>
+          <a:p>
+            <a:r>
+              <a:rPr lang="en-US" dirty="0">
+                <a:latin typeface="Consolas" panose="020B0609020204030204" pitchFamily="49" charset="0"/>
+                <a:cs typeface="Consolas" panose="020B0609020204030204" pitchFamily="49" charset="0"/>
+              </a:rPr>
+              <a:t>	</a:t>
+            </a:r>
+            <a:r>
+              <a:rPr lang="en-US" dirty="0">
+                <a:solidFill>
+                  <a:srgbClr val="0000FF"/>
+                </a:solidFill>
+                <a:latin typeface="Consolas" panose="020B0609020204030204" pitchFamily="49" charset="0"/>
+                <a:ea typeface="Consolas"/>
+                <a:cs typeface="Consolas" panose="020B0609020204030204" pitchFamily="49" charset="0"/>
+              </a:rPr>
+              <a:t>public</a:t>
+            </a:r>
+            <a:r>
+              <a:rPr lang="en-US" dirty="0">
+                <a:latin typeface="Consolas" panose="020B0609020204030204" pitchFamily="49" charset="0"/>
+                <a:cs typeface="Consolas" panose="020B0609020204030204" pitchFamily="49" charset="0"/>
+              </a:rPr>
+              <a:t> </a:t>
+            </a:r>
+            <a:r>
+              <a:rPr lang="en-US" dirty="0" err="1" smtClean="0">
+                <a:latin typeface="Consolas" panose="020B0609020204030204" pitchFamily="49" charset="0"/>
+                <a:cs typeface="Consolas" panose="020B0609020204030204" pitchFamily="49" charset="0"/>
+              </a:rPr>
+              <a:t>HomeController</a:t>
+            </a:r>
+            <a:r>
+              <a:rPr lang="en-US" dirty="0" smtClean="0">
+                <a:latin typeface="Consolas" panose="020B0609020204030204" pitchFamily="49" charset="0"/>
+                <a:cs typeface="Consolas" panose="020B0609020204030204" pitchFamily="49" charset="0"/>
+              </a:rPr>
+              <a:t>(</a:t>
+            </a:r>
+            <a:r>
+              <a:rPr lang="en-US" dirty="0" err="1" smtClean="0">
+                <a:solidFill>
+                  <a:srgbClr val="008B8B"/>
+                </a:solidFill>
+                <a:latin typeface="Consolas" panose="020B0609020204030204" pitchFamily="49" charset="0"/>
+                <a:ea typeface="Consolas"/>
+                <a:cs typeface="Consolas" panose="020B0609020204030204" pitchFamily="49" charset="0"/>
+              </a:rPr>
+              <a:t>ILogger</a:t>
+            </a:r>
+            <a:r>
+              <a:rPr lang="en-US" dirty="0">
+                <a:latin typeface="Consolas" panose="020B0609020204030204" pitchFamily="49" charset="0"/>
+                <a:cs typeface="Consolas" panose="020B0609020204030204" pitchFamily="49" charset="0"/>
+              </a:rPr>
+              <a:t>&lt;</a:t>
+            </a:r>
+            <a:r>
+              <a:rPr lang="en-US" dirty="0" err="1" smtClean="0">
+                <a:solidFill>
+                  <a:srgbClr val="008B8B"/>
+                </a:solidFill>
+                <a:latin typeface="Consolas" panose="020B0609020204030204" pitchFamily="49" charset="0"/>
+                <a:ea typeface="Consolas"/>
+                <a:cs typeface="Consolas" panose="020B0609020204030204" pitchFamily="49" charset="0"/>
+              </a:rPr>
+              <a:t>HomeController</a:t>
+            </a:r>
+            <a:r>
+              <a:rPr lang="en-US" dirty="0">
+                <a:latin typeface="Consolas" panose="020B0609020204030204" pitchFamily="49" charset="0"/>
+                <a:cs typeface="Consolas" panose="020B0609020204030204" pitchFamily="49" charset="0"/>
+              </a:rPr>
+              <a:t>&gt;</a:t>
+            </a:r>
+            <a:r>
+              <a:rPr lang="en-US" dirty="0" smtClean="0">
+                <a:latin typeface="Consolas" panose="020B0609020204030204" pitchFamily="49" charset="0"/>
+                <a:cs typeface="Consolas" panose="020B0609020204030204" pitchFamily="49" charset="0"/>
+              </a:rPr>
+              <a:t> logger) </a:t>
+            </a:r>
+            <a:endParaRPr lang="en-US" dirty="0">
+              <a:latin typeface="Consolas" panose="020B0609020204030204" pitchFamily="49" charset="0"/>
+              <a:cs typeface="Consolas" panose="020B0609020204030204" pitchFamily="49" charset="0"/>
+            </a:endParaRPr>
+          </a:p>
+          <a:p>
+            <a:r>
+              <a:rPr lang="en-US" dirty="0">
+                <a:latin typeface="Consolas" panose="020B0609020204030204" pitchFamily="49" charset="0"/>
+                <a:cs typeface="Consolas" panose="020B0609020204030204" pitchFamily="49" charset="0"/>
+              </a:rPr>
+              <a:t>	{</a:t>
+            </a:r>
+          </a:p>
+          <a:p>
+            <a:r>
+              <a:rPr lang="en-US" dirty="0">
+                <a:latin typeface="Consolas" panose="020B0609020204030204" pitchFamily="49" charset="0"/>
+                <a:cs typeface="Consolas" panose="020B0609020204030204" pitchFamily="49" charset="0"/>
+              </a:rPr>
+              <a:t>		</a:t>
+            </a:r>
+            <a:r>
+              <a:rPr lang="en-US" dirty="0" err="1" smtClean="0">
+                <a:solidFill>
+                  <a:srgbClr val="0000FF"/>
+                </a:solidFill>
+                <a:latin typeface="Consolas" panose="020B0609020204030204" pitchFamily="49" charset="0"/>
+                <a:ea typeface="Consolas"/>
+                <a:cs typeface="Consolas" panose="020B0609020204030204" pitchFamily="49" charset="0"/>
+              </a:rPr>
+              <a:t>this</a:t>
+            </a:r>
+            <a:r>
+              <a:rPr lang="en-US" dirty="0" err="1" smtClean="0">
+                <a:latin typeface="Consolas" panose="020B0609020204030204" pitchFamily="49" charset="0"/>
+                <a:cs typeface="Consolas" panose="020B0609020204030204" pitchFamily="49" charset="0"/>
+              </a:rPr>
+              <a:t>.logger</a:t>
+            </a:r>
+            <a:r>
+              <a:rPr lang="en-US" dirty="0" smtClean="0">
+                <a:latin typeface="Consolas" panose="020B0609020204030204" pitchFamily="49" charset="0"/>
+                <a:cs typeface="Consolas" panose="020B0609020204030204" pitchFamily="49" charset="0"/>
+              </a:rPr>
+              <a:t> </a:t>
+            </a:r>
+            <a:r>
+              <a:rPr lang="en-US" dirty="0">
+                <a:latin typeface="Consolas" panose="020B0609020204030204" pitchFamily="49" charset="0"/>
+                <a:cs typeface="Consolas" panose="020B0609020204030204" pitchFamily="49" charset="0"/>
+              </a:rPr>
+              <a:t>= </a:t>
+            </a:r>
+            <a:r>
+              <a:rPr lang="en-US" dirty="0" smtClean="0">
+                <a:latin typeface="Consolas" panose="020B0609020204030204" pitchFamily="49" charset="0"/>
+                <a:cs typeface="Consolas" panose="020B0609020204030204" pitchFamily="49" charset="0"/>
+              </a:rPr>
+              <a:t>logger;</a:t>
+            </a:r>
+          </a:p>
+          <a:p>
+            <a:r>
+              <a:rPr lang="en-US" dirty="0"/>
+              <a:t>	</a:t>
+            </a:r>
+            <a:r>
+              <a:rPr lang="en-US" dirty="0" smtClean="0"/>
+              <a:t>	</a:t>
+            </a:r>
+            <a:r>
+              <a:rPr lang="en-US" dirty="0" err="1" smtClean="0">
+                <a:solidFill>
+                  <a:srgbClr val="0000FF"/>
+                </a:solidFill>
+                <a:latin typeface="Consolas" panose="020B0609020204030204" pitchFamily="49" charset="0"/>
+                <a:ea typeface="Consolas"/>
+                <a:cs typeface="Consolas" panose="020B0609020204030204" pitchFamily="49" charset="0"/>
+              </a:rPr>
+              <a:t>this</a:t>
+            </a:r>
+            <a:r>
+              <a:rPr lang="en-US" dirty="0" err="1" smtClean="0">
+                <a:latin typeface="Consolas" panose="020B0609020204030204" pitchFamily="49" charset="0"/>
+                <a:cs typeface="Consolas" panose="020B0609020204030204" pitchFamily="49" charset="0"/>
+              </a:rPr>
+              <a:t>.logger.LogInformation</a:t>
+            </a:r>
+            <a:r>
+              <a:rPr lang="en-US" dirty="0" smtClean="0">
+                <a:latin typeface="Consolas" panose="020B0609020204030204" pitchFamily="49" charset="0"/>
+                <a:cs typeface="Consolas" panose="020B0609020204030204" pitchFamily="49" charset="0"/>
+              </a:rPr>
+              <a:t>(</a:t>
+            </a:r>
+            <a:r>
+              <a:rPr lang="en-US" dirty="0">
+                <a:solidFill>
+                  <a:srgbClr val="A31515"/>
+                </a:solidFill>
+                <a:latin typeface="Consolas" panose="020B0609020204030204" pitchFamily="49" charset="0"/>
+                <a:ea typeface="Consolas"/>
+                <a:cs typeface="Consolas" panose="020B0609020204030204" pitchFamily="49" charset="0"/>
+              </a:rPr>
+              <a:t>"</a:t>
+            </a:r>
+            <a:r>
+              <a:rPr lang="en-US" dirty="0" smtClean="0">
+                <a:solidFill>
+                  <a:srgbClr val="A31515"/>
+                </a:solidFill>
+                <a:latin typeface="Consolas" panose="020B0609020204030204" pitchFamily="49" charset="0"/>
+                <a:ea typeface="Consolas"/>
+                <a:cs typeface="Consolas" panose="020B0609020204030204" pitchFamily="49" charset="0"/>
+              </a:rPr>
+              <a:t>Controller </a:t>
+            </a:r>
+            <a:r>
+              <a:rPr lang="en-US" dirty="0">
+                <a:solidFill>
+                  <a:srgbClr val="A31515"/>
+                </a:solidFill>
+                <a:latin typeface="Consolas" panose="020B0609020204030204" pitchFamily="49" charset="0"/>
+                <a:ea typeface="Consolas"/>
+                <a:cs typeface="Consolas" panose="020B0609020204030204" pitchFamily="49" charset="0"/>
+              </a:rPr>
+              <a:t>created"</a:t>
+            </a:r>
+            <a:r>
+              <a:rPr lang="en-US" dirty="0">
+                <a:latin typeface="Consolas" panose="020B0609020204030204" pitchFamily="49" charset="0"/>
+                <a:cs typeface="Consolas" panose="020B0609020204030204" pitchFamily="49" charset="0"/>
+              </a:rPr>
+              <a:t>);</a:t>
+            </a:r>
+            <a:endParaRPr lang="en-US" dirty="0">
+              <a:latin typeface="Consolas" panose="020B0609020204030204" pitchFamily="49" charset="0"/>
+              <a:cs typeface="Consolas" panose="020B0609020204030204" pitchFamily="49" charset="0"/>
+            </a:endParaRPr>
+          </a:p>
+          <a:p>
+            <a:r>
+              <a:rPr lang="en-US" dirty="0">
+                <a:latin typeface="Consolas" panose="020B0609020204030204" pitchFamily="49" charset="0"/>
+                <a:cs typeface="Consolas" panose="020B0609020204030204" pitchFamily="49" charset="0"/>
+              </a:rPr>
+              <a:t>	}</a:t>
+            </a:r>
+          </a:p>
+          <a:p>
+            <a:r>
+              <a:rPr lang="en-US" dirty="0">
+                <a:latin typeface="Consolas" panose="020B0609020204030204" pitchFamily="49" charset="0"/>
+                <a:cs typeface="Consolas" panose="020B0609020204030204" pitchFamily="49" charset="0"/>
+              </a:rPr>
+              <a:t>	</a:t>
+            </a:r>
+          </a:p>
+          <a:p>
+            <a:r>
+              <a:rPr lang="en-US" dirty="0">
+                <a:latin typeface="Consolas" panose="020B0609020204030204" pitchFamily="49" charset="0"/>
+                <a:cs typeface="Consolas" panose="020B0609020204030204" pitchFamily="49" charset="0"/>
+              </a:rPr>
+              <a:t>	</a:t>
+            </a:r>
+            <a:r>
+              <a:rPr lang="en-US" dirty="0">
+                <a:solidFill>
+                  <a:srgbClr val="006400"/>
+                </a:solidFill>
+                <a:latin typeface="Consolas"/>
+                <a:ea typeface="Consolas"/>
+                <a:cs typeface="Consolas"/>
+              </a:rPr>
+              <a:t>//Implementation</a:t>
+            </a:r>
+          </a:p>
+          <a:p>
+            <a:r>
+              <a:rPr lang="en-US" dirty="0">
+                <a:latin typeface="Consolas" panose="020B0609020204030204" pitchFamily="49" charset="0"/>
+                <a:cs typeface="Consolas" panose="020B0609020204030204" pitchFamily="49" charset="0"/>
+              </a:rPr>
+              <a:t>}</a:t>
+            </a:r>
+            <a:endParaRPr lang="en-US" dirty="0">
+              <a:latin typeface="Consolas" panose="020B0609020204030204" pitchFamily="49" charset="0"/>
+              <a:cs typeface="Consolas" panose="020B0609020204030204" pitchFamily="49" charset="0"/>
+            </a:endParaRPr>
+          </a:p>
+        </p:txBody>
+      </p:sp>
+      <p:sp>
+        <p:nvSpPr>
+          <p:cNvPr id="7" name="TextBox 6"/>
+          <p:cNvSpPr txBox="1"/>
+          <p:nvPr/>
+        </p:nvSpPr>
+        <p:spPr>
+          <a:xfrm>
+            <a:off x="7248630" y="1340768"/>
+            <a:ext cx="1582947" cy="307777"/>
+          </a:xfrm>
+          <a:prstGeom prst="rect">
+            <a:avLst/>
+          </a:prstGeom>
+          <a:solidFill>
+            <a:srgbClr val="0070C0"/>
+          </a:solidFill>
+          <a:ln w="19050">
+            <a:noFill/>
+          </a:ln>
+        </p:spPr>
+        <p:txBody>
+          <a:bodyPr wrap="square" rtlCol="0">
+            <a:spAutoFit/>
+          </a:bodyPr>
+          <a:lstStyle/>
+          <a:p>
+            <a:pPr marL="0" marR="0" lvl="0" indent="0" defTabSz="914400" eaLnBrk="1" fontAlgn="auto" latinLnBrk="0" hangingPunct="1">
+              <a:lnSpc>
+                <a:spcPct val="100000"/>
+              </a:lnSpc>
+              <a:spcBef>
+                <a:spcPts val="0"/>
+              </a:spcBef>
+              <a:spcAft>
+                <a:spcPts val="0"/>
+              </a:spcAft>
+              <a:buClrTx/>
+              <a:buSzTx/>
+              <a:buFontTx/>
+              <a:buNone/>
+              <a:tabLst/>
+              <a:defRPr/>
+            </a:pPr>
+            <a:r>
+              <a:rPr kumimoji="0" lang="en-US" sz="1400" b="0" i="0" u="none" strike="noStrike" kern="0" cap="none" spc="0" normalizeH="0" baseline="0" noProof="0" dirty="0" smtClean="0">
+                <a:ln>
+                  <a:noFill/>
+                </a:ln>
+                <a:solidFill>
+                  <a:prstClr val="white"/>
+                </a:solidFill>
+                <a:effectLst/>
+                <a:uLnTx/>
+                <a:uFillTx/>
+                <a:latin typeface="Arial" panose="020B0604020202020204" pitchFamily="34" charset="0"/>
+                <a:cs typeface="Arial" panose="020B0604020202020204" pitchFamily="34" charset="0"/>
+              </a:rPr>
+              <a:t>CODE SNIPPET</a:t>
+            </a:r>
+          </a:p>
+        </p:txBody>
+      </p:sp>
     </p:spTree>
     <p:extLst>
       <p:ext uri="{BB962C8B-B14F-4D97-AF65-F5344CB8AC3E}">
-        <p14:creationId xmlns:p14="http://schemas.microsoft.com/office/powerpoint/2010/main" val="3967209613"/>
+        <p14:creationId xmlns:p14="http://schemas.microsoft.com/office/powerpoint/2010/main" val="1678056575"/>
       </p:ext>
     </p:extLst>
   </p:cSld>
@@ -30805,13 +31348,10 @@
           <a:lstStyle/>
           <a:p>
             <a:r>
-              <a:rPr lang="en-US" dirty="0" smtClean="0"/>
-              <a:t>IT’s ALL </a:t>
-            </a:r>
-            <a:r>
-              <a:rPr lang="en-US" dirty="0"/>
-              <a:t>ABOUT architecture</a:t>
-            </a:r>
+              <a:rPr lang="en-GB" dirty="0" smtClean="0"/>
+              <a:t>TAG HELPERS</a:t>
+            </a:r>
+            <a:endParaRPr lang="en-US" dirty="0"/>
           </a:p>
         </p:txBody>
       </p:sp>
@@ -30853,6 +31393,314 @@
           <a:bodyPr/>
           <a:lstStyle/>
           <a:p>
+            <a:r>
+              <a:rPr lang="en-GB" dirty="0" smtClean="0"/>
+              <a:t>TODO</a:t>
+            </a:r>
+            <a:endParaRPr lang="en-US" dirty="0"/>
+          </a:p>
+        </p:txBody>
+      </p:sp>
+    </p:spTree>
+    <p:extLst>
+      <p:ext uri="{BB962C8B-B14F-4D97-AF65-F5344CB8AC3E}">
+        <p14:creationId xmlns:p14="http://schemas.microsoft.com/office/powerpoint/2010/main" val="4230502830"/>
+      </p:ext>
+    </p:extLst>
+  </p:cSld>
+  <p:clrMapOvr>
+    <a:masterClrMapping/>
+  </p:clrMapOvr>
+</p:sld>
+</file>
+
+<file path=ppt/slides/slide26.xml><?xml version="1.0" encoding="utf-8"?>
+<p:sld xmlns:a="http://schemas.openxmlformats.org/drawingml/2006/main" xmlns:r="http://schemas.openxmlformats.org/officeDocument/2006/relationships" xmlns:p="http://schemas.openxmlformats.org/presentationml/2006/main">
+  <p:cSld>
+    <p:spTree>
+      <p:nvGrpSpPr>
+        <p:cNvPr id="1" name=""/>
+        <p:cNvGrpSpPr/>
+        <p:nvPr/>
+      </p:nvGrpSpPr>
+      <p:grpSpPr>
+        <a:xfrm>
+          <a:off x="0" y="0"/>
+          <a:ext cx="0" cy="0"/>
+          <a:chOff x="0" y="0"/>
+          <a:chExt cx="0" cy="0"/>
+        </a:xfrm>
+      </p:grpSpPr>
+      <p:sp>
+        <p:nvSpPr>
+          <p:cNvPr id="2" name="Text Placeholder 1"/>
+          <p:cNvSpPr>
+            <a:spLocks noGrp="1"/>
+          </p:cNvSpPr>
+          <p:nvPr>
+            <p:ph type="body" sz="quarter" idx="13"/>
+          </p:nvPr>
+        </p:nvSpPr>
+        <p:spPr>
+          <a:xfrm>
+            <a:off x="2699793" y="3573016"/>
+            <a:ext cx="3744416" cy="945788"/>
+          </a:xfrm>
+        </p:spPr>
+        <p:txBody>
+          <a:bodyPr/>
+          <a:lstStyle/>
+          <a:p>
+            <a:r>
+              <a:rPr lang="en-US" dirty="0"/>
+              <a:t>Linus Torvalds</a:t>
+            </a:r>
+          </a:p>
+        </p:txBody>
+      </p:sp>
+      <p:sp>
+        <p:nvSpPr>
+          <p:cNvPr id="3" name="Text Placeholder 2"/>
+          <p:cNvSpPr>
+            <a:spLocks noGrp="1"/>
+          </p:cNvSpPr>
+          <p:nvPr>
+            <p:ph type="body" sz="quarter" idx="11"/>
+          </p:nvPr>
+        </p:nvSpPr>
+        <p:spPr>
+          <a:xfrm>
+            <a:off x="827585" y="2708921"/>
+            <a:ext cx="7488832" cy="1874092"/>
+          </a:xfrm>
+        </p:spPr>
+        <p:txBody>
+          <a:bodyPr/>
+          <a:lstStyle/>
+          <a:p>
+            <a:pPr algn="ctr"/>
+            <a:r>
+              <a:rPr lang="en-US" sz="3600" dirty="0"/>
+              <a:t>Talk is cheap. Show me the code.</a:t>
+            </a:r>
+          </a:p>
+        </p:txBody>
+      </p:sp>
+      <p:sp>
+        <p:nvSpPr>
+          <p:cNvPr id="4" name="Title 3"/>
+          <p:cNvSpPr>
+            <a:spLocks noGrp="1"/>
+          </p:cNvSpPr>
+          <p:nvPr>
+            <p:ph type="title"/>
+          </p:nvPr>
+        </p:nvSpPr>
+        <p:spPr/>
+        <p:txBody>
+          <a:bodyPr/>
+          <a:lstStyle/>
+          <a:p>
+            <a:r>
+              <a:rPr lang="en-GB" dirty="0" smtClean="0"/>
+              <a:t>Quote of the day</a:t>
+            </a:r>
+            <a:endParaRPr lang="en-US" dirty="0"/>
+          </a:p>
+        </p:txBody>
+      </p:sp>
+      <p:sp>
+        <p:nvSpPr>
+          <p:cNvPr id="5" name="Footer Placeholder 4"/>
+          <p:cNvSpPr>
+            <a:spLocks noGrp="1"/>
+          </p:cNvSpPr>
+          <p:nvPr>
+            <p:ph type="ftr" sz="quarter" idx="3"/>
+          </p:nvPr>
+        </p:nvSpPr>
+        <p:spPr/>
+        <p:txBody>
+          <a:bodyPr/>
+          <a:lstStyle/>
+          <a:p>
+            <a:r>
+              <a:rPr lang="en-US" smtClean="0"/>
+              <a:t>PRESENTATION NAME</a:t>
+            </a:r>
+            <a:endParaRPr lang="en-US" dirty="0"/>
+          </a:p>
+        </p:txBody>
+      </p:sp>
+    </p:spTree>
+    <p:extLst>
+      <p:ext uri="{BB962C8B-B14F-4D97-AF65-F5344CB8AC3E}">
+        <p14:creationId xmlns:p14="http://schemas.microsoft.com/office/powerpoint/2010/main" val="3967209613"/>
+      </p:ext>
+    </p:extLst>
+  </p:cSld>
+  <p:clrMapOvr>
+    <a:masterClrMapping/>
+  </p:clrMapOvr>
+  <p:timing>
+    <p:tnLst>
+      <p:par>
+        <p:cTn id="1" dur="indefinite" restart="never" nodeType="tmRoot"/>
+      </p:par>
+    </p:tnLst>
+  </p:timing>
+</p:sld>
+</file>
+
+<file path=ppt/slides/slide27.xml><?xml version="1.0" encoding="utf-8"?>
+<p:sld xmlns:a="http://schemas.openxmlformats.org/drawingml/2006/main" xmlns:r="http://schemas.openxmlformats.org/officeDocument/2006/relationships" xmlns:p="http://schemas.openxmlformats.org/presentationml/2006/main">
+  <p:cSld>
+    <p:spTree>
+      <p:nvGrpSpPr>
+        <p:cNvPr id="1" name=""/>
+        <p:cNvGrpSpPr/>
+        <p:nvPr/>
+      </p:nvGrpSpPr>
+      <p:grpSpPr>
+        <a:xfrm>
+          <a:off x="0" y="0"/>
+          <a:ext cx="0" cy="0"/>
+          <a:chOff x="0" y="0"/>
+          <a:chExt cx="0" cy="0"/>
+        </a:xfrm>
+      </p:grpSpPr>
+      <p:sp>
+        <p:nvSpPr>
+          <p:cNvPr id="2" name="Text Placeholder 1"/>
+          <p:cNvSpPr>
+            <a:spLocks noGrp="1"/>
+          </p:cNvSpPr>
+          <p:nvPr>
+            <p:ph type="body" sz="quarter" idx="11"/>
+          </p:nvPr>
+        </p:nvSpPr>
+        <p:spPr/>
+        <p:txBody>
+          <a:bodyPr/>
+          <a:lstStyle/>
+          <a:p>
+            <a:endParaRPr lang="en-US" dirty="0"/>
+          </a:p>
+        </p:txBody>
+      </p:sp>
+      <p:sp>
+        <p:nvSpPr>
+          <p:cNvPr id="3" name="Text Placeholder 2"/>
+          <p:cNvSpPr>
+            <a:spLocks noGrp="1"/>
+          </p:cNvSpPr>
+          <p:nvPr>
+            <p:ph type="body" sz="quarter" idx="12"/>
+          </p:nvPr>
+        </p:nvSpPr>
+        <p:spPr/>
+        <p:txBody>
+          <a:bodyPr/>
+          <a:lstStyle/>
+          <a:p>
+            <a:endParaRPr lang="en-US"/>
+          </a:p>
+        </p:txBody>
+      </p:sp>
+    </p:spTree>
+    <p:extLst>
+      <p:ext uri="{BB962C8B-B14F-4D97-AF65-F5344CB8AC3E}">
+        <p14:creationId xmlns:p14="http://schemas.microsoft.com/office/powerpoint/2010/main" val="3194048973"/>
+      </p:ext>
+    </p:extLst>
+  </p:cSld>
+  <p:clrMapOvr>
+    <a:masterClrMapping/>
+  </p:clrMapOvr>
+</p:sld>
+</file>
+
+<file path=ppt/slides/slide28.xml><?xml version="1.0" encoding="utf-8"?>
+<p:sld xmlns:a="http://schemas.openxmlformats.org/drawingml/2006/main" xmlns:r="http://schemas.openxmlformats.org/officeDocument/2006/relationships" xmlns:p="http://schemas.openxmlformats.org/presentationml/2006/main">
+  <p:cSld>
+    <p:spTree>
+      <p:nvGrpSpPr>
+        <p:cNvPr id="1" name=""/>
+        <p:cNvGrpSpPr/>
+        <p:nvPr/>
+      </p:nvGrpSpPr>
+      <p:grpSpPr>
+        <a:xfrm>
+          <a:off x="0" y="0"/>
+          <a:ext cx="0" cy="0"/>
+          <a:chOff x="0" y="0"/>
+          <a:chExt cx="0" cy="0"/>
+        </a:xfrm>
+      </p:grpSpPr>
+      <p:sp>
+        <p:nvSpPr>
+          <p:cNvPr id="2" name="Title 1"/>
+          <p:cNvSpPr>
+            <a:spLocks noGrp="1"/>
+          </p:cNvSpPr>
+          <p:nvPr>
+            <p:ph type="title"/>
+          </p:nvPr>
+        </p:nvSpPr>
+        <p:spPr/>
+        <p:txBody>
+          <a:bodyPr/>
+          <a:lstStyle/>
+          <a:p>
+            <a:r>
+              <a:rPr lang="en-US" dirty="0" smtClean="0"/>
+              <a:t>IT’s ALL </a:t>
+            </a:r>
+            <a:r>
+              <a:rPr lang="en-US" dirty="0"/>
+              <a:t>ABOUT architecture</a:t>
+            </a:r>
+          </a:p>
+        </p:txBody>
+      </p:sp>
+      <p:sp>
+        <p:nvSpPr>
+          <p:cNvPr id="3" name="Footer Placeholder 2"/>
+          <p:cNvSpPr>
+            <a:spLocks noGrp="1"/>
+          </p:cNvSpPr>
+          <p:nvPr>
+            <p:ph type="ftr" sz="quarter" idx="3"/>
+          </p:nvPr>
+        </p:nvSpPr>
+        <p:spPr/>
+        <p:txBody>
+          <a:bodyPr/>
+          <a:lstStyle/>
+          <a:p>
+            <a:r>
+              <a:rPr lang="en-US" smtClean="0"/>
+              <a:t>PRESENTATION NAME</a:t>
+            </a:r>
+            <a:endParaRPr lang="en-US" dirty="0"/>
+          </a:p>
+        </p:txBody>
+      </p:sp>
+      <p:sp>
+        <p:nvSpPr>
+          <p:cNvPr id="4" name="Content Placeholder 3"/>
+          <p:cNvSpPr>
+            <a:spLocks noGrp="1"/>
+          </p:cNvSpPr>
+          <p:nvPr>
+            <p:ph sz="quarter" idx="12"/>
+          </p:nvPr>
+        </p:nvSpPr>
+        <p:spPr/>
+        <p:txBody>
+          <a:bodyPr/>
+          <a:lstStyle/>
+          <a:p>
             <a:pPr marL="0" indent="0">
               <a:buNone/>
             </a:pPr>
@@ -30932,7 +31780,7 @@
 </p:sld>
 </file>
 
-<file path=ppt/slides/slide26.xml><?xml version="1.0" encoding="utf-8"?>
+<file path=ppt/slides/slide29.xml><?xml version="1.0" encoding="utf-8"?>
 <p:sld xmlns:a="http://schemas.openxmlformats.org/drawingml/2006/main" xmlns:r="http://schemas.openxmlformats.org/officeDocument/2006/relationships" xmlns:p="http://schemas.openxmlformats.org/presentationml/2006/main">
   <p:cSld>
     <p:spTree>

</xml_diff>